<commit_message>
sirius prezentation + worklog
</commit_message>
<xml_diff>
--- a/doc/prezi/hw2/ztz-presentation.pptx
+++ b/doc/prezi/hw2/ztz-presentation.pptx
@@ -7,10 +7,10 @@
     <p:sldMasterId id="2147483655" r:id="rId3"/>
   </p:sldMasterIdLst>
   <p:notesMasterIdLst>
-    <p:notesMasterId r:id="rId15"/>
+    <p:notesMasterId r:id="rId19"/>
   </p:notesMasterIdLst>
   <p:handoutMasterIdLst>
-    <p:handoutMasterId r:id="rId16"/>
+    <p:handoutMasterId r:id="rId20"/>
   </p:handoutMasterIdLst>
   <p:sldIdLst>
     <p:sldId id="304" r:id="rId4"/>
@@ -23,7 +23,11 @@
     <p:sldId id="321" r:id="rId11"/>
     <p:sldId id="313" r:id="rId12"/>
     <p:sldId id="322" r:id="rId13"/>
-    <p:sldId id="312" r:id="rId14"/>
+    <p:sldId id="323" r:id="rId14"/>
+    <p:sldId id="324" r:id="rId15"/>
+    <p:sldId id="325" r:id="rId16"/>
+    <p:sldId id="326" r:id="rId17"/>
+    <p:sldId id="312" r:id="rId18"/>
   </p:sldIdLst>
   <p:sldSz cx="9144000" cy="6858000" type="screen4x3"/>
   <p:notesSz cx="6858000" cy="9144000"/>
@@ -137,6 +141,10 @@
             <p14:sldId id="321"/>
             <p14:sldId id="313"/>
             <p14:sldId id="322"/>
+            <p14:sldId id="323"/>
+            <p14:sldId id="324"/>
+            <p14:sldId id="325"/>
+            <p14:sldId id="326"/>
             <p14:sldId id="312"/>
           </p14:sldIdLst>
         </p14:section>
@@ -245,7 +253,7 @@
           <a:p>
             <a:fld id="{D320DF98-73A7-40A6-8A84-2EB5B4F2C4CC}" type="datetimeFigureOut">
               <a:rPr lang="hu-HU" smtClean="0"/>
-              <a:t>2016.04.29.</a:t>
+              <a:t>2016. 04. 29.</a:t>
             </a:fld>
             <a:endParaRPr lang="hu-HU"/>
           </a:p>
@@ -411,7 +419,7 @@
             <a:fld id="{B9130191-0BE1-0142-AFC1-0297AE024A0E}" type="datetimeFigureOut">
               <a:rPr lang="en-US" smtClean="0"/>
               <a:pPr/>
-              <a:t>29-Apr-16</a:t>
+              <a:t>4/29/2016</a:t>
             </a:fld>
             <a:endParaRPr lang="en-US"/>
           </a:p>
@@ -961,20 +969,12 @@
               <a:rPr lang="hu-HU" baseline="0" dirty="0" smtClean="0"/>
               <a:t> használja fel, tulajdonképpen importálja. </a:t>
             </a:r>
-            <a:r>
-              <a:rPr lang="hu-HU" baseline="0" dirty="0" smtClean="0"/>
-              <a:t/>
-            </a:r>
             <a:br>
               <a:rPr lang="hu-HU" baseline="0" dirty="0" smtClean="0"/>
             </a:br>
             <a:r>
               <a:rPr lang="hu-HU" baseline="0" dirty="0" smtClean="0"/>
-              <a:t>A </a:t>
-            </a:r>
-            <a:r>
-              <a:rPr lang="hu-HU" baseline="0" dirty="0" smtClean="0"/>
-              <a:t>nyelvtan példánya egy létező strukturális példánymodellt importál, és </a:t>
+              <a:t>A nyelvtan példánya egy létező strukturális példánymodellt importál, és </a:t>
             </a:r>
             <a:r>
               <a:rPr lang="hu-HU" baseline="0" dirty="0" err="1" smtClean="0"/>
@@ -982,15 +982,7 @@
             </a:r>
             <a:r>
               <a:rPr lang="hu-HU" baseline="0" dirty="0" smtClean="0"/>
-              <a:t> egy viselkedésit generál. Ez a </a:t>
-            </a:r>
-            <a:r>
-              <a:rPr lang="hu-HU" baseline="0" dirty="0" smtClean="0"/>
-              <a:t>viselkedés </a:t>
-            </a:r>
-            <a:r>
-              <a:rPr lang="hu-HU" baseline="0" dirty="0" smtClean="0"/>
-              <a:t>példány a strukturális példánymodellt egészíti ki. Tehát ami fontos, hogy létező strukturális példányokhoz vagyunk képesek viselkedést definiálni a nyelvtan segítségével, és viselkedési példányokat generálni, ami a strukturálisra referál.</a:t>
+              <a:t> egy viselkedésit generál. Ez a viselkedés példány a strukturális példánymodellt egészíti ki. Tehát ami fontos, hogy létező strukturális példányokhoz vagyunk képesek viselkedést definiálni a nyelvtan segítségével, és viselkedési példányokat generálni, ami a strukturálisra referál.</a:t>
             </a:r>
             <a:endParaRPr lang="hu-HU" dirty="0"/>
           </a:p>
@@ -1083,11 +1075,7 @@
             </a:r>
             <a:r>
               <a:rPr lang="hu-HU" baseline="0" dirty="0" smtClean="0"/>
-              <a:t> a lényeg, hogy minden hivatkozás a strukturális példányra történik. Automatikus </a:t>
-            </a:r>
-            <a:r>
-              <a:rPr lang="hu-HU" baseline="0" dirty="0" smtClean="0"/>
-              <a:t>kiegészítés van az írás közben, </a:t>
+              <a:t> a lényeg, hogy minden hivatkozás a strukturális példányra történik. Automatikus kiegészítés van az írás közben, </a:t>
             </a:r>
             <a:r>
               <a:rPr lang="hu-HU" baseline="0" dirty="0" err="1" smtClean="0"/>
@@ -1103,11 +1091,7 @@
             </a:r>
             <a:r>
               <a:rPr lang="hu-HU" baseline="0" dirty="0" smtClean="0"/>
-              <a:t> </a:t>
-            </a:r>
-            <a:r>
-              <a:rPr lang="hu-HU" baseline="0" dirty="0" smtClean="0"/>
-              <a:t>átírása megtörtént.</a:t>
+              <a:t> átírása megtörtént.</a:t>
             </a:r>
             <a:endParaRPr lang="hu-HU" dirty="0"/>
           </a:p>
@@ -1325,15 +1309,7 @@
             </a:r>
             <a:r>
               <a:rPr lang="hu-HU" baseline="0" dirty="0" smtClean="0"/>
-              <a:t>: konkrét akció. </a:t>
-            </a:r>
-            <a:r>
-              <a:rPr lang="hu-HU" baseline="0" dirty="0" smtClean="0"/>
-              <a:t>A -&gt; </a:t>
-            </a:r>
-            <a:r>
-              <a:rPr lang="hu-HU" baseline="0" dirty="0" smtClean="0"/>
-              <a:t>jellel utasítások egy sorozatát lehet megadni. </a:t>
+              <a:t>: konkrét akció. A -&gt; jellel utasítások egy sorozatát lehet megadni. </a:t>
             </a:r>
             <a:r>
               <a:rPr lang="hu-HU" baseline="0" dirty="0" err="1" smtClean="0"/>
@@ -1341,15 +1317,7 @@
             </a:r>
             <a:r>
               <a:rPr lang="hu-HU" baseline="0" dirty="0" smtClean="0"/>
-              <a:t>: üzenetek küldése, lehet egy célpont, </a:t>
-            </a:r>
-            <a:r>
-              <a:rPr lang="hu-HU" baseline="0" dirty="0" smtClean="0"/>
-              <a:t>több célpont, </a:t>
-            </a:r>
-            <a:r>
-              <a:rPr lang="hu-HU" baseline="0" dirty="0" smtClean="0"/>
-              <a:t>de akár </a:t>
+              <a:t>: üzenetek küldése, lehet egy célpont, több célpont, de akár </a:t>
             </a:r>
             <a:r>
               <a:rPr lang="hu-HU" baseline="0" dirty="0" err="1" smtClean="0"/>
@@ -1357,19 +1325,7 @@
             </a:r>
             <a:r>
               <a:rPr lang="hu-HU" baseline="0" dirty="0" smtClean="0"/>
-              <a:t> is </a:t>
-            </a:r>
-            <a:r>
-              <a:rPr lang="hu-HU" baseline="0" dirty="0" smtClean="0"/>
-              <a:t>(* operátorral), </a:t>
-            </a:r>
-            <a:r>
-              <a:rPr lang="hu-HU" baseline="0" dirty="0" smtClean="0"/>
-              <a:t>ekkor azoknak küld üzenetet, akikkel kapcsolatban van </a:t>
-            </a:r>
-            <a:r>
-              <a:rPr lang="hu-HU" baseline="0" dirty="0" smtClean="0"/>
-              <a:t>(tehát volt korábban </a:t>
+              <a:t> is (* operátorral), ekkor azoknak küld üzenetet, akikkel kapcsolatban van (tehát volt korábban </a:t>
             </a:r>
             <a:r>
               <a:rPr lang="hu-HU" baseline="0" dirty="0" err="1" smtClean="0"/>
@@ -1377,11 +1333,7 @@
             </a:r>
             <a:r>
               <a:rPr lang="hu-HU" baseline="0" dirty="0" smtClean="0"/>
-              <a:t> </a:t>
-            </a:r>
-            <a:r>
-              <a:rPr lang="hu-HU" baseline="0" dirty="0" smtClean="0"/>
-              <a:t>utasítás közöttük). Üzenetek egymásra épülhetnek, lásd </a:t>
+              <a:t> utasítás közöttük). Üzenetek egymásra épülhetnek, lásd </a:t>
             </a:r>
             <a:r>
               <a:rPr lang="hu-HU" baseline="0" dirty="0" err="1" smtClean="0"/>
@@ -8265,21 +8217,8 @@
                   <a:schemeClr val="tx2"/>
                 </a:solidFill>
               </a:rPr>
-              <a:t>Első feltétel volt </a:t>
-            </a:r>
-            <a:r>
-              <a:rPr lang="hu-HU" sz="2400" dirty="0" smtClean="0">
-                <a:solidFill>
-                  <a:schemeClr val="tx2"/>
-                </a:solidFill>
-              </a:rPr>
-              <a:t>igaz</a:t>
-            </a:r>
-            <a:endParaRPr lang="hu-HU" sz="2400" dirty="0" smtClean="0">
-              <a:solidFill>
-                <a:schemeClr val="tx2"/>
-              </a:solidFill>
-            </a:endParaRPr>
+              <a:t>Első feltétel volt igaz</a:t>
+            </a:r>
           </a:p>
         </p:txBody>
       </p:sp>
@@ -8401,6 +8340,828 @@
       </p:grpSpPr>
       <p:sp>
         <p:nvSpPr>
+          <p:cNvPr id="2" name="Cím 1"/>
+          <p:cNvSpPr>
+            <a:spLocks noGrp="1"/>
+          </p:cNvSpPr>
+          <p:nvPr>
+            <p:ph type="title"/>
+          </p:nvPr>
+        </p:nvSpPr>
+        <p:spPr/>
+        <p:txBody>
+          <a:bodyPr/>
+          <a:lstStyle/>
+          <a:p>
+            <a:r>
+              <a:rPr lang="en-US" dirty="0" smtClean="0"/>
+              <a:t>Sirius editor</a:t>
+            </a:r>
+            <a:endParaRPr lang="en-US" dirty="0"/>
+          </a:p>
+        </p:txBody>
+      </p:sp>
+      <p:sp>
+        <p:nvSpPr>
+          <p:cNvPr id="3" name="Tartalom helye 2"/>
+          <p:cNvSpPr>
+            <a:spLocks noGrp="1"/>
+          </p:cNvSpPr>
+          <p:nvPr>
+            <p:ph idx="1"/>
+          </p:nvPr>
+        </p:nvSpPr>
+        <p:spPr/>
+        <p:txBody>
+          <a:bodyPr/>
+          <a:lstStyle/>
+          <a:p>
+            <a:r>
+              <a:rPr lang="hu-HU" dirty="0" smtClean="0"/>
+              <a:t>Elkészítettük a robot és a környezet leírásához szükséges </a:t>
+            </a:r>
+            <a:r>
+              <a:rPr lang="hu-HU" dirty="0" err="1" smtClean="0"/>
+              <a:t>Sirius</a:t>
+            </a:r>
+            <a:r>
+              <a:rPr lang="hu-HU" dirty="0" smtClean="0"/>
+              <a:t> editorokat</a:t>
+            </a:r>
+          </a:p>
+          <a:p>
+            <a:r>
+              <a:rPr lang="hu-HU" dirty="0" smtClean="0"/>
+              <a:t>A </a:t>
+            </a:r>
+            <a:r>
+              <a:rPr lang="hu-HU" dirty="0" err="1" smtClean="0"/>
+              <a:t>metamodell</a:t>
+            </a:r>
+            <a:r>
+              <a:rPr lang="hu-HU" dirty="0" smtClean="0"/>
+              <a:t> elemeit ezek segítségével meg lehet valósítani</a:t>
+            </a:r>
+            <a:endParaRPr lang="en-US" dirty="0" smtClean="0"/>
+          </a:p>
+          <a:p>
+            <a:endParaRPr lang="hu-HU" dirty="0"/>
+          </a:p>
+        </p:txBody>
+      </p:sp>
+      <p:sp>
+        <p:nvSpPr>
+          <p:cNvPr id="4" name="Dia számának helye 3"/>
+          <p:cNvSpPr>
+            <a:spLocks noGrp="1"/>
+          </p:cNvSpPr>
+          <p:nvPr>
+            <p:ph type="sldNum" sz="quarter" idx="10"/>
+          </p:nvPr>
+        </p:nvSpPr>
+        <p:spPr/>
+        <p:txBody>
+          <a:bodyPr/>
+          <a:lstStyle/>
+          <a:p>
+            <a:fld id="{A7C85712-A09B-4560-9D1E-08050AA835BB}" type="slidenum">
+              <a:rPr lang="hu-HU" smtClean="0"/>
+              <a:pPr/>
+              <a:t>11</a:t>
+            </a:fld>
+            <a:endParaRPr lang="hu-HU" dirty="0"/>
+          </a:p>
+        </p:txBody>
+      </p:sp>
+      <p:pic>
+        <p:nvPicPr>
+          <p:cNvPr id="5" name="Kép 4"/>
+          <p:cNvPicPr>
+            <a:picLocks noChangeAspect="1"/>
+          </p:cNvPicPr>
+          <p:nvPr/>
+        </p:nvPicPr>
+        <p:blipFill>
+          <a:blip r:embed="rId2">
+            <a:extLst>
+              <a:ext uri="{28A0092B-C50C-407E-A947-70E740481C1C}">
+                <a14:useLocalDpi xmlns:a14="http://schemas.microsoft.com/office/drawing/2010/main" val="0"/>
+              </a:ext>
+            </a:extLst>
+          </a:blip>
+          <a:stretch>
+            <a:fillRect/>
+          </a:stretch>
+        </p:blipFill>
+        <p:spPr>
+          <a:xfrm>
+            <a:off x="0" y="720725"/>
+            <a:ext cx="4453622" cy="4241156"/>
+          </a:xfrm>
+          <a:prstGeom prst="rect">
+            <a:avLst/>
+          </a:prstGeom>
+        </p:spPr>
+      </p:pic>
+      <p:pic>
+        <p:nvPicPr>
+          <p:cNvPr id="6" name="Kép 5"/>
+          <p:cNvPicPr>
+            <a:picLocks noChangeAspect="1"/>
+          </p:cNvPicPr>
+          <p:nvPr/>
+        </p:nvPicPr>
+        <p:blipFill>
+          <a:blip r:embed="rId3">
+            <a:extLst>
+              <a:ext uri="{28A0092B-C50C-407E-A947-70E740481C1C}">
+                <a14:useLocalDpi xmlns:a14="http://schemas.microsoft.com/office/drawing/2010/main" val="0"/>
+              </a:ext>
+            </a:extLst>
+          </a:blip>
+          <a:stretch>
+            <a:fillRect/>
+          </a:stretch>
+        </p:blipFill>
+        <p:spPr>
+          <a:xfrm>
+            <a:off x="4210050" y="720725"/>
+            <a:ext cx="4933950" cy="5619750"/>
+          </a:xfrm>
+          <a:prstGeom prst="rect">
+            <a:avLst/>
+          </a:prstGeom>
+        </p:spPr>
+      </p:pic>
+    </p:spTree>
+    <p:extLst>
+      <p:ext uri="{BB962C8B-B14F-4D97-AF65-F5344CB8AC3E}">
+        <p14:creationId xmlns:p14="http://schemas.microsoft.com/office/powerpoint/2010/main" val="387241711"/>
+      </p:ext>
+    </p:extLst>
+  </p:cSld>
+  <p:clrMapOvr>
+    <a:masterClrMapping/>
+  </p:clrMapOvr>
+  <mc:AlternateContent xmlns:mc="http://schemas.openxmlformats.org/markup-compatibility/2006">
+    <mc:Choice xmlns:p14="http://schemas.microsoft.com/office/powerpoint/2010/main" Requires="p14">
+      <p:transition p14:dur="10" advClick="0"/>
+    </mc:Choice>
+    <mc:Fallback>
+      <p:transition advClick="0"/>
+    </mc:Fallback>
+  </mc:AlternateContent>
+  <p:timing>
+    <p:tnLst>
+      <p:par>
+        <p:cTn id="1" dur="indefinite" restart="never" nodeType="tmRoot">
+          <p:childTnLst>
+            <p:seq concurrent="1" nextAc="seek">
+              <p:cTn id="2" dur="indefinite" nodeType="mainSeq">
+                <p:childTnLst>
+                  <p:par>
+                    <p:cTn id="3" fill="hold">
+                      <p:stCondLst>
+                        <p:cond delay="indefinite"/>
+                      </p:stCondLst>
+                      <p:childTnLst>
+                        <p:par>
+                          <p:cTn id="4" fill="hold">
+                            <p:stCondLst>
+                              <p:cond delay="0"/>
+                            </p:stCondLst>
+                            <p:childTnLst>
+                              <p:par>
+                                <p:cTn id="5" presetID="53" presetClass="entr" presetSubtype="16" fill="hold" nodeType="clickEffect">
+                                  <p:stCondLst>
+                                    <p:cond delay="0"/>
+                                  </p:stCondLst>
+                                  <p:childTnLst>
+                                    <p:set>
+                                      <p:cBhvr>
+                                        <p:cTn id="6" dur="1" fill="hold">
+                                          <p:stCondLst>
+                                            <p:cond delay="0"/>
+                                          </p:stCondLst>
+                                        </p:cTn>
+                                        <p:tgtEl>
+                                          <p:spTgt spid="5"/>
+                                        </p:tgtEl>
+                                        <p:attrNameLst>
+                                          <p:attrName>style.visibility</p:attrName>
+                                        </p:attrNameLst>
+                                      </p:cBhvr>
+                                      <p:to>
+                                        <p:strVal val="visible"/>
+                                      </p:to>
+                                    </p:set>
+                                    <p:anim calcmode="lin" valueType="num">
+                                      <p:cBhvr>
+                                        <p:cTn id="7" dur="500" fill="hold"/>
+                                        <p:tgtEl>
+                                          <p:spTgt spid="5"/>
+                                        </p:tgtEl>
+                                        <p:attrNameLst>
+                                          <p:attrName>ppt_w</p:attrName>
+                                        </p:attrNameLst>
+                                      </p:cBhvr>
+                                      <p:tavLst>
+                                        <p:tav tm="0">
+                                          <p:val>
+                                            <p:fltVal val="0"/>
+                                          </p:val>
+                                        </p:tav>
+                                        <p:tav tm="100000">
+                                          <p:val>
+                                            <p:strVal val="#ppt_w"/>
+                                          </p:val>
+                                        </p:tav>
+                                      </p:tavLst>
+                                    </p:anim>
+                                    <p:anim calcmode="lin" valueType="num">
+                                      <p:cBhvr>
+                                        <p:cTn id="8" dur="500" fill="hold"/>
+                                        <p:tgtEl>
+                                          <p:spTgt spid="5"/>
+                                        </p:tgtEl>
+                                        <p:attrNameLst>
+                                          <p:attrName>ppt_h</p:attrName>
+                                        </p:attrNameLst>
+                                      </p:cBhvr>
+                                      <p:tavLst>
+                                        <p:tav tm="0">
+                                          <p:val>
+                                            <p:fltVal val="0"/>
+                                          </p:val>
+                                        </p:tav>
+                                        <p:tav tm="100000">
+                                          <p:val>
+                                            <p:strVal val="#ppt_h"/>
+                                          </p:val>
+                                        </p:tav>
+                                      </p:tavLst>
+                                    </p:anim>
+                                    <p:animEffect transition="in" filter="fade">
+                                      <p:cBhvr>
+                                        <p:cTn id="9" dur="500"/>
+                                        <p:tgtEl>
+                                          <p:spTgt spid="5"/>
+                                        </p:tgtEl>
+                                      </p:cBhvr>
+                                    </p:animEffect>
+                                  </p:childTnLst>
+                                </p:cTn>
+                              </p:par>
+                              <p:par>
+                                <p:cTn id="10" presetID="53" presetClass="entr" presetSubtype="16" fill="hold" nodeType="withEffect">
+                                  <p:stCondLst>
+                                    <p:cond delay="0"/>
+                                  </p:stCondLst>
+                                  <p:childTnLst>
+                                    <p:set>
+                                      <p:cBhvr>
+                                        <p:cTn id="11" dur="1" fill="hold">
+                                          <p:stCondLst>
+                                            <p:cond delay="0"/>
+                                          </p:stCondLst>
+                                        </p:cTn>
+                                        <p:tgtEl>
+                                          <p:spTgt spid="6"/>
+                                        </p:tgtEl>
+                                        <p:attrNameLst>
+                                          <p:attrName>style.visibility</p:attrName>
+                                        </p:attrNameLst>
+                                      </p:cBhvr>
+                                      <p:to>
+                                        <p:strVal val="visible"/>
+                                      </p:to>
+                                    </p:set>
+                                    <p:anim calcmode="lin" valueType="num">
+                                      <p:cBhvr>
+                                        <p:cTn id="12" dur="500" fill="hold"/>
+                                        <p:tgtEl>
+                                          <p:spTgt spid="6"/>
+                                        </p:tgtEl>
+                                        <p:attrNameLst>
+                                          <p:attrName>ppt_w</p:attrName>
+                                        </p:attrNameLst>
+                                      </p:cBhvr>
+                                      <p:tavLst>
+                                        <p:tav tm="0">
+                                          <p:val>
+                                            <p:fltVal val="0"/>
+                                          </p:val>
+                                        </p:tav>
+                                        <p:tav tm="100000">
+                                          <p:val>
+                                            <p:strVal val="#ppt_w"/>
+                                          </p:val>
+                                        </p:tav>
+                                      </p:tavLst>
+                                    </p:anim>
+                                    <p:anim calcmode="lin" valueType="num">
+                                      <p:cBhvr>
+                                        <p:cTn id="13" dur="500" fill="hold"/>
+                                        <p:tgtEl>
+                                          <p:spTgt spid="6"/>
+                                        </p:tgtEl>
+                                        <p:attrNameLst>
+                                          <p:attrName>ppt_h</p:attrName>
+                                        </p:attrNameLst>
+                                      </p:cBhvr>
+                                      <p:tavLst>
+                                        <p:tav tm="0">
+                                          <p:val>
+                                            <p:fltVal val="0"/>
+                                          </p:val>
+                                        </p:tav>
+                                        <p:tav tm="100000">
+                                          <p:val>
+                                            <p:strVal val="#ppt_h"/>
+                                          </p:val>
+                                        </p:tav>
+                                      </p:tavLst>
+                                    </p:anim>
+                                    <p:animEffect transition="in" filter="fade">
+                                      <p:cBhvr>
+                                        <p:cTn id="14" dur="500"/>
+                                        <p:tgtEl>
+                                          <p:spTgt spid="6"/>
+                                        </p:tgtEl>
+                                      </p:cBhvr>
+                                    </p:animEffect>
+                                  </p:childTnLst>
+                                </p:cTn>
+                              </p:par>
+                            </p:childTnLst>
+                          </p:cTn>
+                        </p:par>
+                      </p:childTnLst>
+                    </p:cTn>
+                  </p:par>
+                </p:childTnLst>
+              </p:cTn>
+              <p:prevCondLst>
+                <p:cond evt="onPrev" delay="0">
+                  <p:tgtEl>
+                    <p:sldTgt/>
+                  </p:tgtEl>
+                </p:cond>
+              </p:prevCondLst>
+              <p:nextCondLst>
+                <p:cond evt="onNext" delay="0">
+                  <p:tgtEl>
+                    <p:sldTgt/>
+                  </p:tgtEl>
+                </p:cond>
+              </p:nextCondLst>
+            </p:seq>
+          </p:childTnLst>
+        </p:cTn>
+      </p:par>
+    </p:tnLst>
+  </p:timing>
+</p:sld>
+</file>
+
+<file path=ppt/slides/slide12.xml><?xml version="1.0" encoding="utf-8"?>
+<p:sld xmlns:a="http://schemas.openxmlformats.org/drawingml/2006/main" xmlns:r="http://schemas.openxmlformats.org/officeDocument/2006/relationships" xmlns:p="http://schemas.openxmlformats.org/presentationml/2006/main">
+  <p:cSld>
+    <p:spTree>
+      <p:nvGrpSpPr>
+        <p:cNvPr id="1" name=""/>
+        <p:cNvGrpSpPr/>
+        <p:nvPr/>
+      </p:nvGrpSpPr>
+      <p:grpSpPr>
+        <a:xfrm>
+          <a:off x="0" y="0"/>
+          <a:ext cx="0" cy="0"/>
+          <a:chOff x="0" y="0"/>
+          <a:chExt cx="0" cy="0"/>
+        </a:xfrm>
+      </p:grpSpPr>
+      <p:sp>
+        <p:nvSpPr>
+          <p:cNvPr id="2" name="Cím 1"/>
+          <p:cNvSpPr>
+            <a:spLocks noGrp="1"/>
+          </p:cNvSpPr>
+          <p:nvPr>
+            <p:ph type="title"/>
+          </p:nvPr>
+        </p:nvSpPr>
+        <p:spPr/>
+        <p:txBody>
+          <a:bodyPr/>
+          <a:lstStyle/>
+          <a:p>
+            <a:r>
+              <a:rPr lang="en-US" dirty="0" smtClean="0"/>
+              <a:t>Sirius editor</a:t>
+            </a:r>
+            <a:endParaRPr lang="en-US" dirty="0"/>
+          </a:p>
+        </p:txBody>
+      </p:sp>
+      <p:pic>
+        <p:nvPicPr>
+          <p:cNvPr id="7" name="Tartalom helye 6"/>
+          <p:cNvPicPr>
+            <a:picLocks noGrp="1" noChangeAspect="1"/>
+          </p:cNvPicPr>
+          <p:nvPr>
+            <p:ph idx="1"/>
+          </p:nvPr>
+        </p:nvPicPr>
+        <p:blipFill>
+          <a:blip r:embed="rId2">
+            <a:extLst>
+              <a:ext uri="{28A0092B-C50C-407E-A947-70E740481C1C}">
+                <a14:useLocalDpi xmlns:a14="http://schemas.microsoft.com/office/drawing/2010/main" val="0"/>
+              </a:ext>
+            </a:extLst>
+          </a:blip>
+          <a:stretch>
+            <a:fillRect/>
+          </a:stretch>
+        </p:blipFill>
+        <p:spPr>
+          <a:xfrm>
+            <a:off x="142875" y="1232802"/>
+            <a:ext cx="8858250" cy="4778159"/>
+          </a:xfrm>
+        </p:spPr>
+      </p:pic>
+      <p:sp>
+        <p:nvSpPr>
+          <p:cNvPr id="4" name="Dia számának helye 3"/>
+          <p:cNvSpPr>
+            <a:spLocks noGrp="1"/>
+          </p:cNvSpPr>
+          <p:nvPr>
+            <p:ph type="sldNum" sz="quarter" idx="10"/>
+          </p:nvPr>
+        </p:nvSpPr>
+        <p:spPr/>
+        <p:txBody>
+          <a:bodyPr/>
+          <a:lstStyle/>
+          <a:p>
+            <a:fld id="{A7C85712-A09B-4560-9D1E-08050AA835BB}" type="slidenum">
+              <a:rPr lang="hu-HU" smtClean="0"/>
+              <a:pPr/>
+              <a:t>12</a:t>
+            </a:fld>
+            <a:endParaRPr lang="hu-HU" dirty="0"/>
+          </a:p>
+        </p:txBody>
+      </p:sp>
+    </p:spTree>
+    <p:extLst>
+      <p:ext uri="{BB962C8B-B14F-4D97-AF65-F5344CB8AC3E}">
+        <p14:creationId xmlns:p14="http://schemas.microsoft.com/office/powerpoint/2010/main" val="873267543"/>
+      </p:ext>
+    </p:extLst>
+  </p:cSld>
+  <p:clrMapOvr>
+    <a:masterClrMapping/>
+  </p:clrMapOvr>
+  <mc:AlternateContent xmlns:mc="http://schemas.openxmlformats.org/markup-compatibility/2006">
+    <mc:Choice xmlns:p14="http://schemas.microsoft.com/office/powerpoint/2010/main" Requires="p14">
+      <p:transition p14:dur="10" advClick="0"/>
+    </mc:Choice>
+    <mc:Fallback>
+      <p:transition advClick="0"/>
+    </mc:Fallback>
+  </mc:AlternateContent>
+  <p:timing>
+    <p:tnLst>
+      <p:par>
+        <p:cTn id="1" dur="indefinite" restart="never" nodeType="tmRoot"/>
+      </p:par>
+    </p:tnLst>
+  </p:timing>
+</p:sld>
+</file>
+
+<file path=ppt/slides/slide13.xml><?xml version="1.0" encoding="utf-8"?>
+<p:sld xmlns:a="http://schemas.openxmlformats.org/drawingml/2006/main" xmlns:r="http://schemas.openxmlformats.org/officeDocument/2006/relationships" xmlns:p="http://schemas.openxmlformats.org/presentationml/2006/main">
+  <p:cSld>
+    <p:spTree>
+      <p:nvGrpSpPr>
+        <p:cNvPr id="1" name=""/>
+        <p:cNvGrpSpPr/>
+        <p:nvPr/>
+      </p:nvGrpSpPr>
+      <p:grpSpPr>
+        <a:xfrm>
+          <a:off x="0" y="0"/>
+          <a:ext cx="0" cy="0"/>
+          <a:chOff x="0" y="0"/>
+          <a:chExt cx="0" cy="0"/>
+        </a:xfrm>
+      </p:grpSpPr>
+      <p:sp>
+        <p:nvSpPr>
+          <p:cNvPr id="2" name="Cím 1"/>
+          <p:cNvSpPr>
+            <a:spLocks noGrp="1"/>
+          </p:cNvSpPr>
+          <p:nvPr>
+            <p:ph type="title"/>
+          </p:nvPr>
+        </p:nvSpPr>
+        <p:spPr/>
+        <p:txBody>
+          <a:bodyPr/>
+          <a:lstStyle/>
+          <a:p>
+            <a:r>
+              <a:rPr lang="en-US" dirty="0" smtClean="0"/>
+              <a:t>Sirius editor</a:t>
+            </a:r>
+            <a:endParaRPr lang="en-US" dirty="0"/>
+          </a:p>
+        </p:txBody>
+      </p:sp>
+      <p:pic>
+        <p:nvPicPr>
+          <p:cNvPr id="7" name="Tartalom helye 6"/>
+          <p:cNvPicPr>
+            <a:picLocks noGrp="1" noChangeAspect="1"/>
+          </p:cNvPicPr>
+          <p:nvPr>
+            <p:ph idx="1"/>
+          </p:nvPr>
+        </p:nvPicPr>
+        <p:blipFill>
+          <a:blip r:embed="rId2">
+            <a:extLst>
+              <a:ext uri="{28A0092B-C50C-407E-A947-70E740481C1C}">
+                <a14:useLocalDpi xmlns:a14="http://schemas.microsoft.com/office/drawing/2010/main" val="0"/>
+              </a:ext>
+            </a:extLst>
+          </a:blip>
+          <a:stretch>
+            <a:fillRect/>
+          </a:stretch>
+        </p:blipFill>
+        <p:spPr>
+          <a:xfrm>
+            <a:off x="142875" y="1433496"/>
+            <a:ext cx="8858250" cy="4376771"/>
+          </a:xfrm>
+        </p:spPr>
+      </p:pic>
+      <p:sp>
+        <p:nvSpPr>
+          <p:cNvPr id="4" name="Dia számának helye 3"/>
+          <p:cNvSpPr>
+            <a:spLocks noGrp="1"/>
+          </p:cNvSpPr>
+          <p:nvPr>
+            <p:ph type="sldNum" sz="quarter" idx="10"/>
+          </p:nvPr>
+        </p:nvSpPr>
+        <p:spPr/>
+        <p:txBody>
+          <a:bodyPr/>
+          <a:lstStyle/>
+          <a:p>
+            <a:fld id="{A7C85712-A09B-4560-9D1E-08050AA835BB}" type="slidenum">
+              <a:rPr lang="hu-HU" smtClean="0"/>
+              <a:pPr/>
+              <a:t>13</a:t>
+            </a:fld>
+            <a:endParaRPr lang="hu-HU" dirty="0"/>
+          </a:p>
+        </p:txBody>
+      </p:sp>
+    </p:spTree>
+    <p:extLst>
+      <p:ext uri="{BB962C8B-B14F-4D97-AF65-F5344CB8AC3E}">
+        <p14:creationId xmlns:p14="http://schemas.microsoft.com/office/powerpoint/2010/main" val="4223566891"/>
+      </p:ext>
+    </p:extLst>
+  </p:cSld>
+  <p:clrMapOvr>
+    <a:masterClrMapping/>
+  </p:clrMapOvr>
+  <mc:AlternateContent xmlns:mc="http://schemas.openxmlformats.org/markup-compatibility/2006">
+    <mc:Choice xmlns:p14="http://schemas.microsoft.com/office/powerpoint/2010/main" Requires="p14">
+      <p:transition p14:dur="10" advClick="0"/>
+    </mc:Choice>
+    <mc:Fallback>
+      <p:transition advClick="0"/>
+    </mc:Fallback>
+  </mc:AlternateContent>
+  <p:timing>
+    <p:tnLst>
+      <p:par>
+        <p:cTn id="1" dur="indefinite" restart="never" nodeType="tmRoot"/>
+      </p:par>
+    </p:tnLst>
+  </p:timing>
+</p:sld>
+</file>
+
+<file path=ppt/slides/slide14.xml><?xml version="1.0" encoding="utf-8"?>
+<p:sld xmlns:a="http://schemas.openxmlformats.org/drawingml/2006/main" xmlns:r="http://schemas.openxmlformats.org/officeDocument/2006/relationships" xmlns:p="http://schemas.openxmlformats.org/presentationml/2006/main">
+  <p:cSld>
+    <p:spTree>
+      <p:nvGrpSpPr>
+        <p:cNvPr id="1" name=""/>
+        <p:cNvGrpSpPr/>
+        <p:nvPr/>
+      </p:nvGrpSpPr>
+      <p:grpSpPr>
+        <a:xfrm>
+          <a:off x="0" y="0"/>
+          <a:ext cx="0" cy="0"/>
+          <a:chOff x="0" y="0"/>
+          <a:chExt cx="0" cy="0"/>
+        </a:xfrm>
+      </p:grpSpPr>
+      <p:sp>
+        <p:nvSpPr>
+          <p:cNvPr id="2" name="Cím 1"/>
+          <p:cNvSpPr>
+            <a:spLocks noGrp="1"/>
+          </p:cNvSpPr>
+          <p:nvPr>
+            <p:ph type="title"/>
+          </p:nvPr>
+        </p:nvSpPr>
+        <p:spPr/>
+        <p:txBody>
+          <a:bodyPr/>
+          <a:lstStyle/>
+          <a:p>
+            <a:r>
+              <a:rPr lang="en-US" dirty="0" err="1" smtClean="0"/>
+              <a:t>Munkanapló</a:t>
+            </a:r>
+            <a:endParaRPr lang="en-US" dirty="0"/>
+          </a:p>
+        </p:txBody>
+      </p:sp>
+      <p:sp>
+        <p:nvSpPr>
+          <p:cNvPr id="3" name="Tartalom helye 2"/>
+          <p:cNvSpPr>
+            <a:spLocks noGrp="1"/>
+          </p:cNvSpPr>
+          <p:nvPr>
+            <p:ph idx="1"/>
+          </p:nvPr>
+        </p:nvSpPr>
+        <p:spPr/>
+        <p:txBody>
+          <a:bodyPr/>
+          <a:lstStyle/>
+          <a:p>
+            <a:r>
+              <a:rPr lang="en-US" dirty="0" err="1" smtClean="0"/>
+              <a:t>Eddig</a:t>
+            </a:r>
+            <a:r>
+              <a:rPr lang="en-US" dirty="0" smtClean="0"/>
+              <a:t> a </a:t>
+            </a:r>
+            <a:r>
+              <a:rPr lang="en-US" dirty="0" err="1" smtClean="0"/>
+              <a:t>feladatra</a:t>
+            </a:r>
+            <a:r>
+              <a:rPr lang="en-US" dirty="0" smtClean="0"/>
+              <a:t> </a:t>
+            </a:r>
+            <a:r>
+              <a:rPr lang="en-US" dirty="0" err="1" smtClean="0"/>
+              <a:t>fordított</a:t>
+            </a:r>
+            <a:r>
+              <a:rPr lang="en-US" dirty="0" smtClean="0"/>
+              <a:t> </a:t>
+            </a:r>
+            <a:r>
+              <a:rPr lang="en-US" dirty="0" err="1" smtClean="0"/>
+              <a:t>idő</a:t>
+            </a:r>
+            <a:r>
+              <a:rPr lang="en-US" dirty="0" smtClean="0"/>
+              <a:t>: 105 </a:t>
+            </a:r>
+            <a:r>
+              <a:rPr lang="en-US" dirty="0" err="1" smtClean="0"/>
+              <a:t>óra</a:t>
+            </a:r>
+            <a:endParaRPr lang="hu-HU" dirty="0"/>
+          </a:p>
+        </p:txBody>
+      </p:sp>
+      <p:sp>
+        <p:nvSpPr>
+          <p:cNvPr id="4" name="Dia számának helye 3"/>
+          <p:cNvSpPr>
+            <a:spLocks noGrp="1"/>
+          </p:cNvSpPr>
+          <p:nvPr>
+            <p:ph type="sldNum" sz="quarter" idx="10"/>
+          </p:nvPr>
+        </p:nvSpPr>
+        <p:spPr/>
+        <p:txBody>
+          <a:bodyPr/>
+          <a:lstStyle/>
+          <a:p>
+            <a:fld id="{A7C85712-A09B-4560-9D1E-08050AA835BB}" type="slidenum">
+              <a:rPr lang="hu-HU" smtClean="0"/>
+              <a:pPr/>
+              <a:t>14</a:t>
+            </a:fld>
+            <a:endParaRPr lang="hu-HU" dirty="0"/>
+          </a:p>
+        </p:txBody>
+      </p:sp>
+      <p:pic>
+        <p:nvPicPr>
+          <p:cNvPr id="8" name="Kép 7"/>
+          <p:cNvPicPr>
+            <a:picLocks noChangeAspect="1"/>
+          </p:cNvPicPr>
+          <p:nvPr/>
+        </p:nvPicPr>
+        <p:blipFill>
+          <a:blip r:embed="rId2">
+            <a:extLst>
+              <a:ext uri="{28A0092B-C50C-407E-A947-70E740481C1C}">
+                <a14:useLocalDpi xmlns:a14="http://schemas.microsoft.com/office/drawing/2010/main" val="0"/>
+              </a:ext>
+            </a:extLst>
+          </a:blip>
+          <a:stretch>
+            <a:fillRect/>
+          </a:stretch>
+        </p:blipFill>
+        <p:spPr>
+          <a:xfrm>
+            <a:off x="923271" y="1932416"/>
+            <a:ext cx="7298220" cy="3937043"/>
+          </a:xfrm>
+          <a:prstGeom prst="rect">
+            <a:avLst/>
+          </a:prstGeom>
+        </p:spPr>
+      </p:pic>
+    </p:spTree>
+    <p:extLst>
+      <p:ext uri="{BB962C8B-B14F-4D97-AF65-F5344CB8AC3E}">
+        <p14:creationId xmlns:p14="http://schemas.microsoft.com/office/powerpoint/2010/main" val="1473793819"/>
+      </p:ext>
+    </p:extLst>
+  </p:cSld>
+  <p:clrMapOvr>
+    <a:masterClrMapping/>
+  </p:clrMapOvr>
+  <mc:AlternateContent xmlns:mc="http://schemas.openxmlformats.org/markup-compatibility/2006">
+    <mc:Choice xmlns:p14="http://schemas.microsoft.com/office/powerpoint/2010/main" Requires="p14">
+      <p:transition p14:dur="10" advClick="0"/>
+    </mc:Choice>
+    <mc:Fallback>
+      <p:transition advClick="0"/>
+    </mc:Fallback>
+  </mc:AlternateContent>
+  <p:timing>
+    <p:tnLst>
+      <p:par>
+        <p:cTn id="1" dur="indefinite" restart="never" nodeType="tmRoot"/>
+      </p:par>
+    </p:tnLst>
+  </p:timing>
+</p:sld>
+</file>
+
+<file path=ppt/slides/slide15.xml><?xml version="1.0" encoding="utf-8"?>
+<p:sld xmlns:a="http://schemas.openxmlformats.org/drawingml/2006/main" xmlns:r="http://schemas.openxmlformats.org/officeDocument/2006/relationships" xmlns:p="http://schemas.openxmlformats.org/presentationml/2006/main">
+  <p:cSld>
+    <p:spTree>
+      <p:nvGrpSpPr>
+        <p:cNvPr id="1" name=""/>
+        <p:cNvGrpSpPr/>
+        <p:nvPr/>
+      </p:nvGrpSpPr>
+      <p:grpSpPr>
+        <a:xfrm>
+          <a:off x="0" y="0"/>
+          <a:ext cx="0" cy="0"/>
+          <a:chOff x="0" y="0"/>
+          <a:chExt cx="0" cy="0"/>
+        </a:xfrm>
+      </p:grpSpPr>
+      <p:sp>
+        <p:nvSpPr>
           <p:cNvPr id="5" name="Cím 4"/>
           <p:cNvSpPr>
             <a:spLocks noGrp="1"/>
@@ -8471,7 +9232,7 @@
             <a:fld id="{A7C85712-A09B-4560-9D1E-08050AA835BB}" type="slidenum">
               <a:rPr lang="hu-HU" smtClean="0"/>
               <a:pPr/>
-              <a:t>11</a:t>
+              <a:t>15</a:t>
             </a:fld>
             <a:endParaRPr lang="hu-HU" dirty="0"/>
           </a:p>
@@ -10633,7 +11394,6 @@
               <a:rPr lang="hu-HU" dirty="0"/>
               <a:t>Nyelvtan - deklarálás</a:t>
             </a:r>
-            <a:endParaRPr lang="hu-HU" dirty="0"/>
           </a:p>
         </p:txBody>
       </p:sp>
@@ -11415,15 +12175,7 @@
                   <a:schemeClr val="tx2"/>
                 </a:solidFill>
               </a:rPr>
-              <a:t>Generált </a:t>
-            </a:r>
-            <a:r>
-              <a:rPr lang="hu-HU" sz="2400" dirty="0" smtClean="0">
-                <a:solidFill>
-                  <a:schemeClr val="tx2"/>
-                </a:solidFill>
-              </a:rPr>
-              <a:t>viselkedési példány</a:t>
+              <a:t>Generált viselkedési példány</a:t>
             </a:r>
             <a:endParaRPr lang="hu-HU" sz="2400" dirty="0">
               <a:solidFill>
@@ -11616,21 +12368,8 @@
                   <a:schemeClr val="tx2"/>
                 </a:solidFill>
               </a:rPr>
-              <a:t> utasítás: ismeretség, </a:t>
-            </a:r>
-            <a:r>
-              <a:rPr lang="hu-HU" sz="2400" dirty="0" smtClean="0">
-                <a:solidFill>
-                  <a:schemeClr val="tx2"/>
-                </a:solidFill>
-              </a:rPr>
-              <a:t>kollaboráció</a:t>
-            </a:r>
-            <a:endParaRPr lang="hu-HU" sz="2400" dirty="0" smtClean="0">
-              <a:solidFill>
-                <a:schemeClr val="tx2"/>
-              </a:solidFill>
-            </a:endParaRPr>
+              <a:t> utasítás: ismeretség, kollaboráció</a:t>
+            </a:r>
           </a:p>
         </p:txBody>
       </p:sp>
@@ -11935,23 +12674,7 @@
                   <a:schemeClr val="tx2"/>
                 </a:solidFill>
               </a:rPr>
-              <a:t>-&gt; </a:t>
-            </a:r>
-            <a:r>
-              <a:rPr lang="hu-HU" sz="2400" dirty="0" smtClean="0">
-                <a:solidFill>
-                  <a:schemeClr val="tx2"/>
-                </a:solidFill>
-              </a:rPr>
-              <a:t>jel: utasítás </a:t>
-            </a:r>
-            <a:r>
-              <a:rPr lang="hu-HU" sz="2400" dirty="0" smtClean="0">
-                <a:solidFill>
-                  <a:schemeClr val="tx2"/>
-                </a:solidFill>
-              </a:rPr>
-              <a:t>szekvencia</a:t>
+              <a:t>-&gt; jel: utasítás szekvencia</a:t>
             </a:r>
             <a:endParaRPr lang="hu-HU" sz="2400" dirty="0">
               <a:solidFill>
@@ -12280,7 +13003,6 @@
               <a:rPr lang="hu-HU" dirty="0"/>
               <a:t>Nyelvtan - utasítások</a:t>
             </a:r>
-            <a:endParaRPr lang="hu-HU" dirty="0"/>
           </a:p>
         </p:txBody>
       </p:sp>
@@ -12735,7 +13457,6 @@
               <a:rPr lang="hu-HU" dirty="0"/>
               <a:t>Nyelvtan - utasítások</a:t>
             </a:r>
-            <a:endParaRPr lang="hu-HU" dirty="0"/>
           </a:p>
         </p:txBody>
       </p:sp>
@@ -13105,7 +13826,6 @@
               <a:rPr lang="hu-HU" dirty="0"/>
               <a:t>Nyelvtan - utasítások</a:t>
             </a:r>
-            <a:endParaRPr lang="hu-HU" dirty="0"/>
           </a:p>
         </p:txBody>
       </p:sp>
@@ -13586,21 +14306,8 @@
                   <a:schemeClr val="tx2"/>
                 </a:solidFill>
               </a:rPr>
-              <a:t>Feltételes </a:t>
-            </a:r>
-            <a:r>
-              <a:rPr lang="hu-HU" sz="2400" dirty="0" smtClean="0">
-                <a:solidFill>
-                  <a:schemeClr val="tx2"/>
-                </a:solidFill>
-              </a:rPr>
-              <a:t>elágazások</a:t>
-            </a:r>
-            <a:endParaRPr lang="hu-HU" sz="2400" dirty="0" smtClean="0">
-              <a:solidFill>
-                <a:schemeClr val="tx2"/>
-              </a:solidFill>
-            </a:endParaRPr>
+              <a:t>Feltételes elágazások</a:t>
+            </a:r>
           </a:p>
         </p:txBody>
       </p:sp>
@@ -13663,21 +14370,8 @@
                   <a:schemeClr val="tx2"/>
                 </a:solidFill>
               </a:rPr>
-              <a:t>Tetszőleges </a:t>
-            </a:r>
-            <a:r>
-              <a:rPr lang="hu-HU" sz="2400" dirty="0" smtClean="0">
-                <a:solidFill>
-                  <a:schemeClr val="tx2"/>
-                </a:solidFill>
-              </a:rPr>
-              <a:t>mélységű lehet</a:t>
-            </a:r>
-            <a:endParaRPr lang="hu-HU" sz="2400" dirty="0" smtClean="0">
-              <a:solidFill>
-                <a:schemeClr val="tx2"/>
-              </a:solidFill>
-            </a:endParaRPr>
+              <a:t>Tetszőleges mélységű lehet</a:t>
+            </a:r>
           </a:p>
         </p:txBody>
       </p:sp>
@@ -13748,21 +14442,8 @@
                   <a:schemeClr val="tx2"/>
                 </a:solidFill>
               </a:rPr>
-              <a:t> </a:t>
-            </a:r>
-            <a:r>
-              <a:rPr lang="hu-HU" sz="2400" dirty="0" smtClean="0">
-                <a:solidFill>
-                  <a:schemeClr val="tx2"/>
-                </a:solidFill>
-              </a:rPr>
-              <a:t>ág is definiálható</a:t>
-            </a:r>
-            <a:endParaRPr lang="hu-HU" sz="2400" dirty="0" smtClean="0">
-              <a:solidFill>
-                <a:schemeClr val="tx2"/>
-              </a:solidFill>
-            </a:endParaRPr>
+              <a:t> ág is definiálható</a:t>
+            </a:r>
           </a:p>
         </p:txBody>
       </p:sp>

</xml_diff>